<commit_message>
amélioration du chapitre I
</commit_message>
<xml_diff>
--- a/CH.1 Introduction/Figures/Figures.pptx
+++ b/CH.1 Introduction/Figures/Figures.pptx
@@ -11,8 +11,9 @@
     <p:sldId id="259" r:id="rId5"/>
     <p:sldId id="260" r:id="rId6"/>
     <p:sldId id="261" r:id="rId7"/>
-    <p:sldId id="262" r:id="rId8"/>
-    <p:sldId id="263" r:id="rId9"/>
+    <p:sldId id="264" r:id="rId8"/>
+    <p:sldId id="262" r:id="rId9"/>
+    <p:sldId id="263" r:id="rId10"/>
   </p:sldIdLst>
   <p:sldSz cx="12192000" cy="6858000"/>
   <p:notesSz cx="6858000" cy="9144000"/>
@@ -250,7 +251,7 @@
           <a:p>
             <a:fld id="{8C5CA392-9FC9-4C97-8CCF-1818B5F02F7F}" type="datetimeFigureOut">
               <a:rPr lang="fr-FR" smtClean="0"/>
-              <a:t>31/08/2018</a:t>
+              <a:t>18/12/2018</a:t>
             </a:fld>
             <a:endParaRPr lang="fr-FR"/>
           </a:p>
@@ -420,7 +421,7 @@
           <a:p>
             <a:fld id="{8C5CA392-9FC9-4C97-8CCF-1818B5F02F7F}" type="datetimeFigureOut">
               <a:rPr lang="fr-FR" smtClean="0"/>
-              <a:t>31/08/2018</a:t>
+              <a:t>18/12/2018</a:t>
             </a:fld>
             <a:endParaRPr lang="fr-FR"/>
           </a:p>
@@ -600,7 +601,7 @@
           <a:p>
             <a:fld id="{8C5CA392-9FC9-4C97-8CCF-1818B5F02F7F}" type="datetimeFigureOut">
               <a:rPr lang="fr-FR" smtClean="0"/>
-              <a:t>31/08/2018</a:t>
+              <a:t>18/12/2018</a:t>
             </a:fld>
             <a:endParaRPr lang="fr-FR"/>
           </a:p>
@@ -770,7 +771,7 @@
           <a:p>
             <a:fld id="{8C5CA392-9FC9-4C97-8CCF-1818B5F02F7F}" type="datetimeFigureOut">
               <a:rPr lang="fr-FR" smtClean="0"/>
-              <a:t>31/08/2018</a:t>
+              <a:t>18/12/2018</a:t>
             </a:fld>
             <a:endParaRPr lang="fr-FR"/>
           </a:p>
@@ -1016,7 +1017,7 @@
           <a:p>
             <a:fld id="{8C5CA392-9FC9-4C97-8CCF-1818B5F02F7F}" type="datetimeFigureOut">
               <a:rPr lang="fr-FR" smtClean="0"/>
-              <a:t>31/08/2018</a:t>
+              <a:t>18/12/2018</a:t>
             </a:fld>
             <a:endParaRPr lang="fr-FR"/>
           </a:p>
@@ -1248,7 +1249,7 @@
           <a:p>
             <a:fld id="{8C5CA392-9FC9-4C97-8CCF-1818B5F02F7F}" type="datetimeFigureOut">
               <a:rPr lang="fr-FR" smtClean="0"/>
-              <a:t>31/08/2018</a:t>
+              <a:t>18/12/2018</a:t>
             </a:fld>
             <a:endParaRPr lang="fr-FR"/>
           </a:p>
@@ -1615,7 +1616,7 @@
           <a:p>
             <a:fld id="{8C5CA392-9FC9-4C97-8CCF-1818B5F02F7F}" type="datetimeFigureOut">
               <a:rPr lang="fr-FR" smtClean="0"/>
-              <a:t>31/08/2018</a:t>
+              <a:t>18/12/2018</a:t>
             </a:fld>
             <a:endParaRPr lang="fr-FR"/>
           </a:p>
@@ -1733,7 +1734,7 @@
           <a:p>
             <a:fld id="{8C5CA392-9FC9-4C97-8CCF-1818B5F02F7F}" type="datetimeFigureOut">
               <a:rPr lang="fr-FR" smtClean="0"/>
-              <a:t>31/08/2018</a:t>
+              <a:t>18/12/2018</a:t>
             </a:fld>
             <a:endParaRPr lang="fr-FR"/>
           </a:p>
@@ -1828,7 +1829,7 @@
           <a:p>
             <a:fld id="{8C5CA392-9FC9-4C97-8CCF-1818B5F02F7F}" type="datetimeFigureOut">
               <a:rPr lang="fr-FR" smtClean="0"/>
-              <a:t>31/08/2018</a:t>
+              <a:t>18/12/2018</a:t>
             </a:fld>
             <a:endParaRPr lang="fr-FR"/>
           </a:p>
@@ -2105,7 +2106,7 @@
           <a:p>
             <a:fld id="{8C5CA392-9FC9-4C97-8CCF-1818B5F02F7F}" type="datetimeFigureOut">
               <a:rPr lang="fr-FR" smtClean="0"/>
-              <a:t>31/08/2018</a:t>
+              <a:t>18/12/2018</a:t>
             </a:fld>
             <a:endParaRPr lang="fr-FR"/>
           </a:p>
@@ -2358,7 +2359,7 @@
           <a:p>
             <a:fld id="{8C5CA392-9FC9-4C97-8CCF-1818B5F02F7F}" type="datetimeFigureOut">
               <a:rPr lang="fr-FR" smtClean="0"/>
-              <a:t>31/08/2018</a:t>
+              <a:t>18/12/2018</a:t>
             </a:fld>
             <a:endParaRPr lang="fr-FR"/>
           </a:p>
@@ -2571,7 +2572,7 @@
           <a:p>
             <a:fld id="{8C5CA392-9FC9-4C97-8CCF-1818B5F02F7F}" type="datetimeFigureOut">
               <a:rPr lang="fr-FR" smtClean="0"/>
-              <a:t>31/08/2018</a:t>
+              <a:t>18/12/2018</a:t>
             </a:fld>
             <a:endParaRPr lang="fr-FR"/>
           </a:p>
@@ -5390,6 +5391,66 @@
 </file>
 
 <file path=ppt/slides/slide7.xml><?xml version="1.0" encoding="utf-8"?>
+<p:sld xmlns:a="http://schemas.openxmlformats.org/drawingml/2006/main" xmlns:r="http://schemas.openxmlformats.org/officeDocument/2006/relationships" xmlns:p="http://schemas.openxmlformats.org/presentationml/2006/main">
+  <p:cSld>
+    <p:spTree>
+      <p:nvGrpSpPr>
+        <p:cNvPr id="1" name=""/>
+        <p:cNvGrpSpPr/>
+        <p:nvPr/>
+      </p:nvGrpSpPr>
+      <p:grpSpPr>
+        <a:xfrm>
+          <a:off x="0" y="0"/>
+          <a:ext cx="0" cy="0"/>
+          <a:chOff x="0" y="0"/>
+          <a:chExt cx="0" cy="0"/>
+        </a:xfrm>
+      </p:grpSpPr>
+      <p:pic>
+        <p:nvPicPr>
+          <p:cNvPr id="4" name="Image 3"/>
+          <p:cNvPicPr>
+            <a:picLocks noChangeAspect="1"/>
+          </p:cNvPicPr>
+          <p:nvPr/>
+        </p:nvPicPr>
+        <p:blipFill>
+          <a:blip r:embed="rId2">
+            <a:extLst>
+              <a:ext uri="{28A0092B-C50C-407E-A947-70E740481C1C}">
+                <a14:useLocalDpi xmlns:a14="http://schemas.microsoft.com/office/drawing/2010/main" val="0"/>
+              </a:ext>
+            </a:extLst>
+          </a:blip>
+          <a:stretch>
+            <a:fillRect/>
+          </a:stretch>
+        </p:blipFill>
+        <p:spPr>
+          <a:xfrm>
+            <a:off x="1134095" y="1057571"/>
+            <a:ext cx="9923809" cy="4742857"/>
+          </a:xfrm>
+          <a:prstGeom prst="rect">
+            <a:avLst/>
+          </a:prstGeom>
+        </p:spPr>
+      </p:pic>
+    </p:spTree>
+    <p:extLst>
+      <p:ext uri="{BB962C8B-B14F-4D97-AF65-F5344CB8AC3E}">
+        <p14:creationId xmlns:p14="http://schemas.microsoft.com/office/powerpoint/2010/main" val="352103076"/>
+      </p:ext>
+    </p:extLst>
+  </p:cSld>
+  <p:clrMapOvr>
+    <a:masterClrMapping/>
+  </p:clrMapOvr>
+</p:sld>
+</file>
+
+<file path=ppt/slides/slide8.xml><?xml version="1.0" encoding="utf-8"?>
 <p:sld xmlns:a="http://schemas.openxmlformats.org/drawingml/2006/main" xmlns:r="http://schemas.openxmlformats.org/officeDocument/2006/relationships" xmlns:p="http://schemas.openxmlformats.org/presentationml/2006/main">
   <p:cSld>
     <p:spTree>
@@ -6293,7 +6354,7 @@
 </p:sld>
 </file>
 
-<file path=ppt/slides/slide8.xml><?xml version="1.0" encoding="utf-8"?>
+<file path=ppt/slides/slide9.xml><?xml version="1.0" encoding="utf-8"?>
 <p:sld xmlns:a="http://schemas.openxmlformats.org/drawingml/2006/main" xmlns:r="http://schemas.openxmlformats.org/officeDocument/2006/relationships" xmlns:p="http://schemas.openxmlformats.org/presentationml/2006/main">
   <p:cSld>
     <p:spTree>
@@ -6515,11 +6576,7 @@
             <a:p>
               <a:r>
                 <a:rPr lang="fr-FR" sz="2000" dirty="0" smtClean="0"/>
-                <a:t>Boucle du mécanisme </a:t>
-              </a:r>
-              <a:r>
-                <a:rPr lang="fr-FR" sz="2000" dirty="0" smtClean="0"/>
-                <a:t>rétroactif</a:t>
+                <a:t>Boucle du mécanisme rétroactif</a:t>
               </a:r>
               <a:endParaRPr lang="fr-FR" sz="2000" dirty="0"/>
             </a:p>
@@ -6560,7 +6617,6 @@
                 <a:rPr lang="fr-FR" dirty="0" smtClean="0"/>
                 <a:t>synchrone due au balourd</a:t>
               </a:r>
-              <a:endParaRPr lang="fr-FR" dirty="0" smtClean="0"/>
             </a:p>
           </p:txBody>
         </p:sp>
@@ -6595,7 +6651,6 @@
                 <a:rPr lang="fr-FR" dirty="0" smtClean="0"/>
                 <a:t>Différence de la température du rotor</a:t>
               </a:r>
-              <a:endParaRPr lang="fr-FR" dirty="0" smtClean="0"/>
             </a:p>
           </p:txBody>
         </p:sp>
@@ -6711,8 +6766,8 @@
             </a:fontRef>
           </p:style>
         </p:cxnSp>
-        <mc:AlternateContent xmlns:mc="http://schemas.openxmlformats.org/markup-compatibility/2006">
-          <mc:Choice xmlns:a14="http://schemas.microsoft.com/office/drawing/2010/main" Requires="a14">
+        <mc:AlternateContent xmlns:mc="http://schemas.openxmlformats.org/markup-compatibility/2006" xmlns:a14="http://schemas.microsoft.com/office/drawing/2010/main">
+          <mc:Choice Requires="a14">
             <p:sp>
               <p:nvSpPr>
                 <p:cNvPr id="75" name="Rectangle 74"/>
@@ -6862,7 +6917,7 @@
               </p:txBody>
             </p:sp>
           </mc:Choice>
-          <mc:Fallback>
+          <mc:Fallback xmlns="">
             <p:sp>
               <p:nvSpPr>
                 <p:cNvPr id="75" name="Rectangle 74"/>
@@ -6907,8 +6962,8 @@
             </p:sp>
           </mc:Fallback>
         </mc:AlternateContent>
-        <mc:AlternateContent xmlns:mc="http://schemas.openxmlformats.org/markup-compatibility/2006">
-          <mc:Choice xmlns:a14="http://schemas.microsoft.com/office/drawing/2010/main" Requires="a14">
+        <mc:AlternateContent xmlns:mc="http://schemas.openxmlformats.org/markup-compatibility/2006" xmlns:a14="http://schemas.microsoft.com/office/drawing/2010/main">
+          <mc:Choice Requires="a14">
             <p:sp>
               <p:nvSpPr>
                 <p:cNvPr id="87" name="Rectangle 86"/>
@@ -7049,7 +7104,7 @@
               </p:txBody>
             </p:sp>
           </mc:Choice>
-          <mc:Fallback>
+          <mc:Fallback xmlns="">
             <p:sp>
               <p:nvSpPr>
                 <p:cNvPr id="87" name="Rectangle 86"/>
@@ -7094,8 +7149,8 @@
             </p:sp>
           </mc:Fallback>
         </mc:AlternateContent>
-        <mc:AlternateContent xmlns:mc="http://schemas.openxmlformats.org/markup-compatibility/2006">
-          <mc:Choice xmlns:a14="http://schemas.microsoft.com/office/drawing/2010/main" Requires="a14">
+        <mc:AlternateContent xmlns:mc="http://schemas.openxmlformats.org/markup-compatibility/2006" xmlns:a14="http://schemas.microsoft.com/office/drawing/2010/main">
+          <mc:Choice Requires="a14">
             <p:sp>
               <p:nvSpPr>
                 <p:cNvPr id="89" name="Rectangle 88"/>
@@ -7236,7 +7291,7 @@
               </p:txBody>
             </p:sp>
           </mc:Choice>
-          <mc:Fallback>
+          <mc:Fallback xmlns="">
             <p:sp>
               <p:nvSpPr>
                 <p:cNvPr id="89" name="Rectangle 88"/>

</xml_diff>

<commit_message>
amélioration du chapitre 1 et 2 après les relectures des encadrants
</commit_message>
<xml_diff>
--- a/CH.1 Introduction/Figures/Figures.pptx
+++ b/CH.1 Introduction/Figures/Figures.pptx
@@ -251,7 +251,7 @@
           <a:p>
             <a:fld id="{8C5CA392-9FC9-4C97-8CCF-1818B5F02F7F}" type="datetimeFigureOut">
               <a:rPr lang="fr-FR" smtClean="0"/>
-              <a:t>18/12/2018</a:t>
+              <a:t>07/01/2019</a:t>
             </a:fld>
             <a:endParaRPr lang="fr-FR"/>
           </a:p>
@@ -421,7 +421,7 @@
           <a:p>
             <a:fld id="{8C5CA392-9FC9-4C97-8CCF-1818B5F02F7F}" type="datetimeFigureOut">
               <a:rPr lang="fr-FR" smtClean="0"/>
-              <a:t>18/12/2018</a:t>
+              <a:t>07/01/2019</a:t>
             </a:fld>
             <a:endParaRPr lang="fr-FR"/>
           </a:p>
@@ -601,7 +601,7 @@
           <a:p>
             <a:fld id="{8C5CA392-9FC9-4C97-8CCF-1818B5F02F7F}" type="datetimeFigureOut">
               <a:rPr lang="fr-FR" smtClean="0"/>
-              <a:t>18/12/2018</a:t>
+              <a:t>07/01/2019</a:t>
             </a:fld>
             <a:endParaRPr lang="fr-FR"/>
           </a:p>
@@ -771,7 +771,7 @@
           <a:p>
             <a:fld id="{8C5CA392-9FC9-4C97-8CCF-1818B5F02F7F}" type="datetimeFigureOut">
               <a:rPr lang="fr-FR" smtClean="0"/>
-              <a:t>18/12/2018</a:t>
+              <a:t>07/01/2019</a:t>
             </a:fld>
             <a:endParaRPr lang="fr-FR"/>
           </a:p>
@@ -1017,7 +1017,7 @@
           <a:p>
             <a:fld id="{8C5CA392-9FC9-4C97-8CCF-1818B5F02F7F}" type="datetimeFigureOut">
               <a:rPr lang="fr-FR" smtClean="0"/>
-              <a:t>18/12/2018</a:t>
+              <a:t>07/01/2019</a:t>
             </a:fld>
             <a:endParaRPr lang="fr-FR"/>
           </a:p>
@@ -1249,7 +1249,7 @@
           <a:p>
             <a:fld id="{8C5CA392-9FC9-4C97-8CCF-1818B5F02F7F}" type="datetimeFigureOut">
               <a:rPr lang="fr-FR" smtClean="0"/>
-              <a:t>18/12/2018</a:t>
+              <a:t>07/01/2019</a:t>
             </a:fld>
             <a:endParaRPr lang="fr-FR"/>
           </a:p>
@@ -1616,7 +1616,7 @@
           <a:p>
             <a:fld id="{8C5CA392-9FC9-4C97-8CCF-1818B5F02F7F}" type="datetimeFigureOut">
               <a:rPr lang="fr-FR" smtClean="0"/>
-              <a:t>18/12/2018</a:t>
+              <a:t>07/01/2019</a:t>
             </a:fld>
             <a:endParaRPr lang="fr-FR"/>
           </a:p>
@@ -1734,7 +1734,7 @@
           <a:p>
             <a:fld id="{8C5CA392-9FC9-4C97-8CCF-1818B5F02F7F}" type="datetimeFigureOut">
               <a:rPr lang="fr-FR" smtClean="0"/>
-              <a:t>18/12/2018</a:t>
+              <a:t>07/01/2019</a:t>
             </a:fld>
             <a:endParaRPr lang="fr-FR"/>
           </a:p>
@@ -1829,7 +1829,7 @@
           <a:p>
             <a:fld id="{8C5CA392-9FC9-4C97-8CCF-1818B5F02F7F}" type="datetimeFigureOut">
               <a:rPr lang="fr-FR" smtClean="0"/>
-              <a:t>18/12/2018</a:t>
+              <a:t>07/01/2019</a:t>
             </a:fld>
             <a:endParaRPr lang="fr-FR"/>
           </a:p>
@@ -2106,7 +2106,7 @@
           <a:p>
             <a:fld id="{8C5CA392-9FC9-4C97-8CCF-1818B5F02F7F}" type="datetimeFigureOut">
               <a:rPr lang="fr-FR" smtClean="0"/>
-              <a:t>18/12/2018</a:t>
+              <a:t>07/01/2019</a:t>
             </a:fld>
             <a:endParaRPr lang="fr-FR"/>
           </a:p>
@@ -2359,7 +2359,7 @@
           <a:p>
             <a:fld id="{8C5CA392-9FC9-4C97-8CCF-1818B5F02F7F}" type="datetimeFigureOut">
               <a:rPr lang="fr-FR" smtClean="0"/>
-              <a:t>18/12/2018</a:t>
+              <a:t>07/01/2019</a:t>
             </a:fld>
             <a:endParaRPr lang="fr-FR"/>
           </a:p>
@@ -2572,7 +2572,7 @@
           <a:p>
             <a:fld id="{8C5CA392-9FC9-4C97-8CCF-1818B5F02F7F}" type="datetimeFigureOut">
               <a:rPr lang="fr-FR" smtClean="0"/>
-              <a:t>18/12/2018</a:t>
+              <a:t>07/01/2019</a:t>
             </a:fld>
             <a:endParaRPr lang="fr-FR"/>
           </a:p>
@@ -6319,8 +6319,8 @@
         </p:nvSpPr>
         <p:spPr>
           <a:xfrm>
-            <a:off x="4838112" y="1280303"/>
-            <a:ext cx="2943441" cy="400110"/>
+            <a:off x="4252946" y="1280303"/>
+            <a:ext cx="3459790" cy="400110"/>
           </a:xfrm>
           <a:prstGeom prst="rect">
             <a:avLst/>
@@ -6334,8 +6334,8 @@
           <a:lstStyle/>
           <a:p>
             <a:r>
-              <a:rPr lang="fr-FR" sz="2000" smtClean="0"/>
-              <a:t>Mécanisme rétroactif</a:t>
+              <a:rPr lang="fr-FR" sz="2000" dirty="0" smtClean="0"/>
+              <a:t>Rétroaction de l’effet Morton</a:t>
             </a:r>
             <a:endParaRPr lang="fr-FR" sz="2000" dirty="0"/>
           </a:p>
@@ -6560,8 +6560,8 @@
           </p:nvSpPr>
           <p:spPr>
             <a:xfrm>
-              <a:off x="4401126" y="3382056"/>
-              <a:ext cx="3629355" cy="400110"/>
+              <a:off x="4160023" y="3382056"/>
+              <a:ext cx="4111562" cy="400110"/>
             </a:xfrm>
             <a:prstGeom prst="rect">
               <a:avLst/>
@@ -6576,7 +6576,11 @@
             <a:p>
               <a:r>
                 <a:rPr lang="fr-FR" sz="2000" dirty="0" smtClean="0"/>
-                <a:t>Boucle du mécanisme rétroactif</a:t>
+                <a:t>Boucle </a:t>
+              </a:r>
+              <a:r>
+                <a:rPr lang="fr-FR" sz="2000" dirty="0" smtClean="0"/>
+                <a:t>rétroactive de l’effet Morton</a:t>
               </a:r>
               <a:endParaRPr lang="fr-FR" sz="2000" dirty="0"/>
             </a:p>

</xml_diff>